<commit_message>
Updated slides and solution for More Threads
</commit_message>
<xml_diff>
--- a/ClassMaterials/MoreThreads/MoreThreads.pptx
+++ b/ClassMaterials/MoreThreads/MoreThreads.pptx
@@ -139,6 +139,7 @@
 <p1510:revInfo xmlns:a="http://schemas.openxmlformats.org/drawingml/2006/main" xmlns:r="http://schemas.openxmlformats.org/officeDocument/2006/relationships" xmlns:p1510="http://schemas.microsoft.com/office/powerpoint/2015/10/main">
   <p1510:revLst>
     <p1510:client id="{86B649C0-B944-4E97-845B-C6ACC5AF60E5}" v="384" dt="2018-12-13T15:57:09.527"/>
+    <p1510:client id="{923920CE-0AF2-8A55-660B-8FD234BBC592}" v="6" dt="2018-12-13T18:43:42.142"/>
   </p1510:revLst>
 </p1510:revInfo>
 </file>
@@ -150,6 +151,30 @@
   </pc:docChgLst>
   <pc:docChgLst>
     <pc:chgData name="Song, Lixing" userId="d86a4794-d57c-4f6d-acee-3349d9d3edfc" providerId="ADAL" clId="{57BE710F-CAAC-5C4C-B1E2-33D10347FAC9}"/>
+  </pc:docChgLst>
+  <pc:docChgLst>
+    <pc:chgData name="Hewner, Michael P" userId="S::hewner@rose-hulman.edu::7f3f83dd-6dfb-4127-a87f-c1714bd4fac9" providerId="AD" clId="Web-{923920CE-0AF2-8A55-660B-8FD234BBC592}"/>
+    <pc:docChg chg="modSld">
+      <pc:chgData name="Hewner, Michael P" userId="S::hewner@rose-hulman.edu::7f3f83dd-6dfb-4127-a87f-c1714bd4fac9" providerId="AD" clId="Web-{923920CE-0AF2-8A55-660B-8FD234BBC592}" dt="2018-12-13T18:43:42.142" v="5" actId="20577"/>
+      <pc:docMkLst>
+        <pc:docMk/>
+      </pc:docMkLst>
+      <pc:sldChg chg="modSp">
+        <pc:chgData name="Hewner, Michael P" userId="S::hewner@rose-hulman.edu::7f3f83dd-6dfb-4127-a87f-c1714bd4fac9" providerId="AD" clId="Web-{923920CE-0AF2-8A55-660B-8FD234BBC592}" dt="2018-12-13T18:43:42.142" v="5" actId="20577"/>
+        <pc:sldMkLst>
+          <pc:docMk/>
+          <pc:sldMk cId="0" sldId="264"/>
+        </pc:sldMkLst>
+        <pc:spChg chg="mod">
+          <ac:chgData name="Hewner, Michael P" userId="S::hewner@rose-hulman.edu::7f3f83dd-6dfb-4127-a87f-c1714bd4fac9" providerId="AD" clId="Web-{923920CE-0AF2-8A55-660B-8FD234BBC592}" dt="2018-12-13T18:43:42.142" v="5" actId="20577"/>
+          <ac:spMkLst>
+            <pc:docMk/>
+            <pc:sldMk cId="0" sldId="264"/>
+            <ac:spMk id="200" creationId="{00000000-0000-0000-0000-000000000000}"/>
+          </ac:spMkLst>
+        </pc:spChg>
+      </pc:sldChg>
+    </pc:docChg>
   </pc:docChgLst>
   <pc:docChgLst>
     <pc:chgData name="Song, Lixing" userId="d86a4794-d57c-4f6d-acee-3349d9d3edfc" providerId="ADAL" clId="{6256184C-17FA-4944-87C5-3041B62521D9}"/>
@@ -426,12 +451,51 @@
     </pc:docChg>
   </pc:docChgLst>
   <pc:docChgLst>
+    <pc:chgData name="Hewner, Michael P" userId="S::hewner@rose-hulman.edu::7f3f83dd-6dfb-4127-a87f-c1714bd4fac9" providerId="AD" clId="Web-{E9A886B4-3C67-711A-8022-900501216E1A}"/>
+    <pc:docChg chg="modSld">
+      <pc:chgData name="Hewner, Michael P" userId="S::hewner@rose-hulman.edu::7f3f83dd-6dfb-4127-a87f-c1714bd4fac9" providerId="AD" clId="Web-{E9A886B4-3C67-711A-8022-900501216E1A}" dt="2018-12-13T16:17:18.895" v="23" actId="20577"/>
+      <pc:docMkLst>
+        <pc:docMk/>
+      </pc:docMkLst>
+      <pc:sldChg chg="modSp">
+        <pc:chgData name="Hewner, Michael P" userId="S::hewner@rose-hulman.edu::7f3f83dd-6dfb-4127-a87f-c1714bd4fac9" providerId="AD" clId="Web-{E9A886B4-3C67-711A-8022-900501216E1A}" dt="2018-12-13T16:14:16.435" v="17" actId="20577"/>
+        <pc:sldMkLst>
+          <pc:docMk/>
+          <pc:sldMk cId="0" sldId="264"/>
+        </pc:sldMkLst>
+        <pc:spChg chg="mod">
+          <ac:chgData name="Hewner, Michael P" userId="S::hewner@rose-hulman.edu::7f3f83dd-6dfb-4127-a87f-c1714bd4fac9" providerId="AD" clId="Web-{E9A886B4-3C67-711A-8022-900501216E1A}" dt="2018-12-13T16:14:16.435" v="17" actId="20577"/>
+          <ac:spMkLst>
+            <pc:docMk/>
+            <pc:sldMk cId="0" sldId="264"/>
+            <ac:spMk id="200" creationId="{00000000-0000-0000-0000-000000000000}"/>
+          </ac:spMkLst>
+        </pc:spChg>
+      </pc:sldChg>
+      <pc:sldChg chg="modSp">
+        <pc:chgData name="Hewner, Michael P" userId="S::hewner@rose-hulman.edu::7f3f83dd-6dfb-4127-a87f-c1714bd4fac9" providerId="AD" clId="Web-{E9A886B4-3C67-711A-8022-900501216E1A}" dt="2018-12-13T16:17:18.895" v="23" actId="20577"/>
+        <pc:sldMkLst>
+          <pc:docMk/>
+          <pc:sldMk cId="0" sldId="265"/>
+        </pc:sldMkLst>
+        <pc:spChg chg="mod">
+          <ac:chgData name="Hewner, Michael P" userId="S::hewner@rose-hulman.edu::7f3f83dd-6dfb-4127-a87f-c1714bd4fac9" providerId="AD" clId="Web-{E9A886B4-3C67-711A-8022-900501216E1A}" dt="2018-12-13T16:17:18.895" v="23" actId="20577"/>
+          <ac:spMkLst>
+            <pc:docMk/>
+            <pc:sldMk cId="0" sldId="265"/>
+            <ac:spMk id="206" creationId="{00000000-0000-0000-0000-000000000000}"/>
+          </ac:spMkLst>
+        </pc:spChg>
+      </pc:sldChg>
+    </pc:docChg>
+  </pc:docChgLst>
+  <pc:docChgLst>
     <pc:chgData name="Song, Lixing" userId="d86a4794-d57c-4f6d-acee-3349d9d3edfc" providerId="ADAL" clId="{41CAD8FE-0633-0C44-91B6-9FBD914D6317}"/>
   </pc:docChgLst>
   <pc:docChgLst>
     <pc:chgData name="Song, Lixing" userId="d86a4794-d57c-4f6d-acee-3349d9d3edfc" providerId="ADAL" clId="{86B649C0-B944-4E97-845B-C6ACC5AF60E5}"/>
     <pc:docChg chg="custSel addSld delSld modSld sldOrd">
-      <pc:chgData name="Song, Lixing" userId="d86a4794-d57c-4f6d-acee-3349d9d3edfc" providerId="ADAL" clId="{86B649C0-B944-4E97-845B-C6ACC5AF60E5}" dt="2018-12-13T15:57:09.527" v="1717"/>
+      <pc:chgData name="Song, Lixing" userId="d86a4794-d57c-4f6d-acee-3349d9d3edfc" providerId="ADAL" clId="{86B649C0-B944-4E97-845B-C6ACC5AF60E5}" dt="2018-12-13T18:31:26.519" v="1718" actId="113"/>
       <pc:docMkLst>
         <pc:docMk/>
       </pc:docMkLst>
@@ -474,7 +538,7 @@
         </pc:spChg>
       </pc:sldChg>
       <pc:sldChg chg="addSp modSp add modAnim">
-        <pc:chgData name="Song, Lixing" userId="d86a4794-d57c-4f6d-acee-3349d9d3edfc" providerId="ADAL" clId="{86B649C0-B944-4E97-845B-C6ACC5AF60E5}" dt="2018-12-07T15:28:52.615" v="239"/>
+        <pc:chgData name="Song, Lixing" userId="d86a4794-d57c-4f6d-acee-3349d9d3edfc" providerId="ADAL" clId="{86B649C0-B944-4E97-845B-C6ACC5AF60E5}" dt="2018-12-13T18:31:26.519" v="1718" actId="113"/>
         <pc:sldMkLst>
           <pc:docMk/>
           <pc:sldMk cId="0" sldId="264"/>
@@ -496,7 +560,7 @@
           </ac:spMkLst>
         </pc:spChg>
         <pc:spChg chg="mod">
-          <ac:chgData name="Song, Lixing" userId="d86a4794-d57c-4f6d-acee-3349d9d3edfc" providerId="ADAL" clId="{86B649C0-B944-4E97-845B-C6ACC5AF60E5}" dt="2018-12-07T04:01:23.022" v="172" actId="20577"/>
+          <ac:chgData name="Song, Lixing" userId="d86a4794-d57c-4f6d-acee-3349d9d3edfc" providerId="ADAL" clId="{86B649C0-B944-4E97-845B-C6ACC5AF60E5}" dt="2018-12-13T18:31:26.519" v="1718" actId="113"/>
           <ac:spMkLst>
             <pc:docMk/>
             <pc:sldMk cId="0" sldId="264"/>
@@ -11261,7 +11325,34 @@
                 <a:cs typeface="Consolas"/>
                 <a:sym typeface="Consolas"/>
               </a:rPr>
-              <a:t> tid = (</a:t>
+              <a:t> </a:t>
+            </a:r>
+            <a:r>
+              <a:rPr lang="en" sz="1800" err="1">
+                <a:latin typeface="Consolas"/>
+                <a:ea typeface="Consolas"/>
+                <a:cs typeface="Consolas"/>
+                <a:sym typeface="Consolas"/>
+              </a:rPr>
+              <a:t>tid</a:t>
+            </a:r>
+            <a:r>
+              <a:rPr lang="en" sz="1800" dirty="0">
+                <a:latin typeface="Consolas"/>
+                <a:ea typeface="Consolas"/>
+                <a:cs typeface="Consolas"/>
+                <a:sym typeface="Consolas"/>
+              </a:rPr>
+              <a:t> = </a:t>
+            </a:r>
+            <a:r>
+              <a:rPr lang="en" sz="1800">
+                <a:latin typeface="Consolas"/>
+                <a:ea typeface="Consolas"/>
+                <a:cs typeface="Consolas"/>
+                <a:sym typeface="Consolas"/>
+              </a:rPr>
+              <a:t>*((</a:t>
             </a:r>
             <a:r>
               <a:rPr lang="en" sz="1800" b="1" dirty="0">
@@ -11276,13 +11367,51 @@
               <a:t>int</a:t>
             </a:r>
             <a:r>
-              <a:rPr lang="en" sz="1800" dirty="0">
+              <a:rPr lang="en" sz="1800" b="1">
+                <a:solidFill>
+                  <a:srgbClr val="465510"/>
+                </a:solidFill>
                 <a:latin typeface="Consolas"/>
                 <a:ea typeface="Consolas"/>
                 <a:cs typeface="Consolas"/>
                 <a:sym typeface="Consolas"/>
               </a:rPr>
-              <a:t>)arg;</a:t>
+              <a:t>*</a:t>
+            </a:r>
+            <a:r>
+              <a:rPr lang="en" sz="1800">
+                <a:latin typeface="Consolas"/>
+                <a:ea typeface="Consolas"/>
+                <a:cs typeface="Consolas"/>
+                <a:sym typeface="Consolas"/>
+              </a:rPr>
+              <a:t>) </a:t>
+            </a:r>
+            <a:r>
+              <a:rPr lang="en" sz="1800" err="1">
+                <a:latin typeface="Consolas"/>
+                <a:ea typeface="Consolas"/>
+                <a:cs typeface="Consolas"/>
+                <a:sym typeface="Consolas"/>
+              </a:rPr>
+              <a:t>arg</a:t>
+            </a:r>
+            <a:r>
+              <a:rPr lang="en" sz="1800">
+                <a:latin typeface="Consolas"/>
+                <a:ea typeface="Consolas"/>
+                <a:cs typeface="Consolas"/>
+                <a:sym typeface="Consolas"/>
+              </a:rPr>
+              <a:t>)</a:t>
+            </a:r>
+            <a:r>
+              <a:rPr lang="en" sz="1800">
+                <a:latin typeface="Consolas"/>
+                <a:ea typeface="Consolas"/>
+                <a:cs typeface="Consolas"/>
+              </a:rPr>
+              <a:t>;</a:t>
             </a:r>
             <a:endParaRPr sz="1800" dirty="0">
               <a:latin typeface="Consolas"/>
@@ -11511,6 +11640,35 @@
             </a:pPr>
             <a:r>
               <a:rPr lang="en" sz="1800" b="1" dirty="0">
+                <a:latin typeface="Consolas"/>
+                <a:ea typeface="Consolas"/>
+                <a:cs typeface="Consolas"/>
+              </a:rPr>
+              <a:t>int </a:t>
+            </a:r>
+            <a:r>
+              <a:rPr lang="en" sz="1800" b="1" dirty="0" err="1">
+                <a:latin typeface="Consolas"/>
+                <a:ea typeface="Consolas"/>
+                <a:cs typeface="Consolas"/>
+              </a:rPr>
+              <a:t>i</a:t>
+            </a:r>
+            <a:r>
+              <a:rPr lang="en" sz="1800" b="1" dirty="0">
+                <a:latin typeface="Consolas"/>
+                <a:ea typeface="Consolas"/>
+                <a:cs typeface="Consolas"/>
+              </a:rPr>
+              <a:t> = 7;</a:t>
+            </a:r>
+          </a:p>
+          <a:p>
+            <a:pPr marL="0" indent="0">
+              <a:buNone/>
+            </a:pPr>
+            <a:r>
+              <a:rPr lang="en" sz="1800" b="1" dirty="0" err="1">
                 <a:solidFill>
                   <a:srgbClr val="002B5B"/>
                 </a:solidFill>
@@ -11574,15 +11732,21 @@
             </a:r>
             <a:r>
               <a:rPr lang="en" sz="1800" b="1" dirty="0">
-                <a:solidFill>
-                  <a:srgbClr val="5F1709"/>
-                </a:solidFill>
                 <a:latin typeface="Consolas"/>
                 <a:ea typeface="Consolas"/>
                 <a:cs typeface="Consolas"/>
                 <a:sym typeface="Consolas"/>
               </a:rPr>
-              <a:t>0</a:t>
+              <a:t>&amp;</a:t>
+            </a:r>
+            <a:r>
+              <a:rPr lang="en" sz="1800" b="1" dirty="0" err="1">
+                <a:latin typeface="Consolas"/>
+                <a:ea typeface="Consolas"/>
+                <a:cs typeface="Consolas"/>
+                <a:sym typeface="Consolas"/>
+              </a:rPr>
+              <a:t>i</a:t>
             </a:r>
             <a:r>
               <a:rPr lang="en" sz="1800" dirty="0">
@@ -11946,15 +12110,6 @@
               <a:buNone/>
             </a:pPr>
             <a:r>
-              <a:rPr lang="en" dirty="0">
-                <a:latin typeface="Consolas"/>
-                <a:ea typeface="Consolas"/>
-                <a:cs typeface="Consolas"/>
-                <a:sym typeface="Consolas"/>
-              </a:rPr>
-              <a:t>	</a:t>
-            </a:r>
-            <a:r>
               <a:rPr lang="en" sz="2400" b="1" dirty="0">
                 <a:solidFill>
                   <a:srgbClr val="465510"/>
@@ -11964,7 +12119,7 @@
                 <a:cs typeface="Consolas"/>
                 <a:sym typeface="Consolas"/>
               </a:rPr>
-              <a:t>int</a:t>
+              <a:t>   int*</a:t>
             </a:r>
             <a:r>
               <a:rPr lang="en" sz="2400" dirty="0">

</xml_diff>